<commit_message>
Finalized all shiny content
</commit_message>
<xml_diff>
--- a/tutorials/intro-to-shiny/images/Content/Content.pptx
+++ b/tutorials/intro-to-shiny/images/Content/Content.pptx
@@ -5,16 +5,20 @@
     <p:sldMasterId id="2147483648" r:id="rId1"/>
   </p:sldMasterIdLst>
   <p:notesMasterIdLst>
-    <p:notesMasterId r:id="rId9"/>
+    <p:notesMasterId r:id="rId13"/>
   </p:notesMasterIdLst>
   <p:sldIdLst>
     <p:sldId id="411" r:id="rId2"/>
-    <p:sldId id="412" r:id="rId3"/>
-    <p:sldId id="413" r:id="rId4"/>
-    <p:sldId id="414" r:id="rId5"/>
-    <p:sldId id="415" r:id="rId6"/>
-    <p:sldId id="416" r:id="rId7"/>
-    <p:sldId id="417" r:id="rId8"/>
+    <p:sldId id="418" r:id="rId3"/>
+    <p:sldId id="412" r:id="rId4"/>
+    <p:sldId id="413" r:id="rId5"/>
+    <p:sldId id="414" r:id="rId6"/>
+    <p:sldId id="419" r:id="rId7"/>
+    <p:sldId id="420" r:id="rId8"/>
+    <p:sldId id="415" r:id="rId9"/>
+    <p:sldId id="416" r:id="rId10"/>
+    <p:sldId id="417" r:id="rId11"/>
+    <p:sldId id="421" r:id="rId12"/>
   </p:sldIdLst>
   <p:sldSz cx="12192000" cy="6858000"/>
   <p:notesSz cx="6858000" cy="9144000"/>
@@ -203,7 +207,7 @@
           <a:p>
             <a:fld id="{6A7A486E-77D8-8E45-B782-DCB14EA2A774}" type="datetimeFigureOut">
               <a:rPr lang="en-US" smtClean="0"/>
-              <a:t>11/24/23</a:t>
+              <a:t>11/28/23</a:t>
             </a:fld>
             <a:endParaRPr lang="en-US"/>
           </a:p>
@@ -617,7 +621,7 @@
           <a:p>
             <a:fld id="{462AE08B-FC62-A14A-A283-DE322E7D125E}" type="datetimeFigureOut">
               <a:rPr lang="en-US" smtClean="0"/>
-              <a:t>11/24/23</a:t>
+              <a:t>11/28/23</a:t>
             </a:fld>
             <a:endParaRPr lang="en-US"/>
           </a:p>
@@ -815,7 +819,7 @@
           <a:p>
             <a:fld id="{462AE08B-FC62-A14A-A283-DE322E7D125E}" type="datetimeFigureOut">
               <a:rPr lang="en-US" smtClean="0"/>
-              <a:t>11/24/23</a:t>
+              <a:t>11/28/23</a:t>
             </a:fld>
             <a:endParaRPr lang="en-US"/>
           </a:p>
@@ -1023,7 +1027,7 @@
           <a:p>
             <a:fld id="{462AE08B-FC62-A14A-A283-DE322E7D125E}" type="datetimeFigureOut">
               <a:rPr lang="en-US" smtClean="0"/>
-              <a:t>11/24/23</a:t>
+              <a:t>11/28/23</a:t>
             </a:fld>
             <a:endParaRPr lang="en-US"/>
           </a:p>
@@ -1620,7 +1624,7 @@
           <a:p>
             <a:fld id="{462AE08B-FC62-A14A-A283-DE322E7D125E}" type="datetimeFigureOut">
               <a:rPr lang="en-US" smtClean="0"/>
-              <a:t>11/24/23</a:t>
+              <a:t>11/28/23</a:t>
             </a:fld>
             <a:endParaRPr lang="en-US"/>
           </a:p>
@@ -1895,7 +1899,7 @@
           <a:p>
             <a:fld id="{462AE08B-FC62-A14A-A283-DE322E7D125E}" type="datetimeFigureOut">
               <a:rPr lang="en-US" smtClean="0"/>
-              <a:t>11/24/23</a:t>
+              <a:t>11/28/23</a:t>
             </a:fld>
             <a:endParaRPr lang="en-US"/>
           </a:p>
@@ -2160,7 +2164,7 @@
           <a:p>
             <a:fld id="{462AE08B-FC62-A14A-A283-DE322E7D125E}" type="datetimeFigureOut">
               <a:rPr lang="en-US" smtClean="0"/>
-              <a:t>11/24/23</a:t>
+              <a:t>11/28/23</a:t>
             </a:fld>
             <a:endParaRPr lang="en-US"/>
           </a:p>
@@ -2572,7 +2576,7 @@
           <a:p>
             <a:fld id="{462AE08B-FC62-A14A-A283-DE322E7D125E}" type="datetimeFigureOut">
               <a:rPr lang="en-US" smtClean="0"/>
-              <a:t>11/24/23</a:t>
+              <a:t>11/28/23</a:t>
             </a:fld>
             <a:endParaRPr lang="en-US"/>
           </a:p>
@@ -2713,7 +2717,7 @@
           <a:p>
             <a:fld id="{462AE08B-FC62-A14A-A283-DE322E7D125E}" type="datetimeFigureOut">
               <a:rPr lang="en-US" smtClean="0"/>
-              <a:t>11/24/23</a:t>
+              <a:t>11/28/23</a:t>
             </a:fld>
             <a:endParaRPr lang="en-US"/>
           </a:p>
@@ -2826,7 +2830,7 @@
           <a:p>
             <a:fld id="{462AE08B-FC62-A14A-A283-DE322E7D125E}" type="datetimeFigureOut">
               <a:rPr lang="en-US" smtClean="0"/>
-              <a:t>11/24/23</a:t>
+              <a:t>11/28/23</a:t>
             </a:fld>
             <a:endParaRPr lang="en-US"/>
           </a:p>
@@ -3137,7 +3141,7 @@
           <a:p>
             <a:fld id="{462AE08B-FC62-A14A-A283-DE322E7D125E}" type="datetimeFigureOut">
               <a:rPr lang="en-US" smtClean="0"/>
-              <a:t>11/24/23</a:t>
+              <a:t>11/28/23</a:t>
             </a:fld>
             <a:endParaRPr lang="en-US"/>
           </a:p>
@@ -3425,7 +3429,7 @@
           <a:p>
             <a:fld id="{462AE08B-FC62-A14A-A283-DE322E7D125E}" type="datetimeFigureOut">
               <a:rPr lang="en-US" smtClean="0"/>
-              <a:t>11/24/23</a:t>
+              <a:t>11/28/23</a:t>
             </a:fld>
             <a:endParaRPr lang="en-US"/>
           </a:p>
@@ -3666,7 +3670,7 @@
           <a:p>
             <a:fld id="{462AE08B-FC62-A14A-A283-DE322E7D125E}" type="datetimeFigureOut">
               <a:rPr lang="en-US" smtClean="0"/>
-              <a:t>11/24/23</a:t>
+              <a:t>11/28/23</a:t>
             </a:fld>
             <a:endParaRPr lang="en-US"/>
           </a:p>
@@ -4212,7 +4216,7 @@
 </p:sld>
 </file>
 
-<file path=ppt/slides/slide2.xml><?xml version="1.0" encoding="utf-8"?>
+<file path=ppt/slides/slide10.xml><?xml version="1.0" encoding="utf-8"?>
 <p:sld xmlns:a="http://schemas.openxmlformats.org/drawingml/2006/main" xmlns:r="http://schemas.openxmlformats.org/officeDocument/2006/relationships" xmlns:p="http://schemas.openxmlformats.org/presentationml/2006/main">
   <p:cSld>
     <p:spTree>
@@ -4231,10 +4235,10 @@
       </p:grpSpPr>
       <p:grpSp>
         <p:nvGrpSpPr>
-          <p:cNvPr id="16" name="Group 15">
-            <a:extLst>
-              <a:ext uri="{FF2B5EF4-FFF2-40B4-BE49-F238E27FC236}">
-                <a16:creationId xmlns:a16="http://schemas.microsoft.com/office/drawing/2014/main" id="{BE5F7573-B7E0-73A1-B981-27AE60575367}"/>
+          <p:cNvPr id="6" name="Group 5">
+            <a:extLst>
+              <a:ext uri="{FF2B5EF4-FFF2-40B4-BE49-F238E27FC236}">
+                <a16:creationId xmlns:a16="http://schemas.microsoft.com/office/drawing/2014/main" id="{326D660D-8806-2058-05A1-FE0D08DBFA9E}"/>
               </a:ext>
             </a:extLst>
           </p:cNvPr>
@@ -4243,18 +4247,440 @@
         </p:nvGrpSpPr>
         <p:grpSpPr>
           <a:xfrm>
-            <a:off x="1839685" y="1613005"/>
-            <a:ext cx="7772400" cy="2802754"/>
-            <a:chOff x="1839685" y="1613005"/>
-            <a:chExt cx="7772400" cy="2802754"/>
+            <a:off x="892629" y="638383"/>
+            <a:ext cx="7014687" cy="3683551"/>
+            <a:chOff x="2133601" y="485983"/>
+            <a:chExt cx="7014687" cy="3683551"/>
           </a:xfrm>
         </p:grpSpPr>
+        <p:pic>
+          <p:nvPicPr>
+            <p:cNvPr id="3074" name="Picture 2" descr="Structure of a basic app with sidebar">
+              <a:extLst>
+                <a:ext uri="{FF2B5EF4-FFF2-40B4-BE49-F238E27FC236}">
+                  <a16:creationId xmlns:a16="http://schemas.microsoft.com/office/drawing/2014/main" id="{4BC5A374-A490-D6F2-8B9F-AEA4B21410FF}"/>
+                </a:ext>
+              </a:extLst>
+            </p:cNvPr>
+            <p:cNvPicPr>
+              <a:picLocks noChangeAspect="1" noChangeArrowheads="1"/>
+            </p:cNvPicPr>
+            <p:nvPr/>
+          </p:nvPicPr>
+          <p:blipFill>
+            <a:blip r:embed="rId2">
+              <a:extLst>
+                <a:ext uri="{28A0092B-C50C-407E-A947-70E740481C1C}">
+                  <a14:useLocalDpi xmlns:a14="http://schemas.microsoft.com/office/drawing/2010/main" val="0"/>
+                </a:ext>
+              </a:extLst>
+            </a:blip>
+            <a:srcRect/>
+            <a:stretch>
+              <a:fillRect/>
+            </a:stretch>
+          </p:blipFill>
+          <p:spPr bwMode="auto">
+            <a:xfrm>
+              <a:off x="2133601" y="485983"/>
+              <a:ext cx="3014969" cy="1661766"/>
+            </a:xfrm>
+            <a:prstGeom prst="rect">
+              <a:avLst/>
+            </a:prstGeom>
+            <a:noFill/>
+            <a:extLst>
+              <a:ext uri="{909E8E84-426E-40DD-AFC4-6F175D3DCCD1}">
+                <a14:hiddenFill xmlns:a14="http://schemas.microsoft.com/office/drawing/2010/main">
+                  <a:solidFill>
+                    <a:srgbClr val="FFFFFF"/>
+                  </a:solidFill>
+                </a14:hiddenFill>
+              </a:ext>
+            </a:extLst>
+          </p:spPr>
+        </p:pic>
+        <p:pic>
+          <p:nvPicPr>
+            <p:cNvPr id="3076" name="Picture 4" descr="The structure underlying a simple multi-row app">
+              <a:extLst>
+                <a:ext uri="{FF2B5EF4-FFF2-40B4-BE49-F238E27FC236}">
+                  <a16:creationId xmlns:a16="http://schemas.microsoft.com/office/drawing/2014/main" id="{27322FF0-7345-B818-1722-83E5091F339D}"/>
+                </a:ext>
+              </a:extLst>
+            </p:cNvPr>
+            <p:cNvPicPr>
+              <a:picLocks noChangeAspect="1" noChangeArrowheads="1"/>
+            </p:cNvPicPr>
+            <p:nvPr/>
+          </p:nvPicPr>
+          <p:blipFill>
+            <a:blip r:embed="rId3">
+              <a:extLst>
+                <a:ext uri="{28A0092B-C50C-407E-A947-70E740481C1C}">
+                  <a14:useLocalDpi xmlns:a14="http://schemas.microsoft.com/office/drawing/2010/main" val="0"/>
+                </a:ext>
+              </a:extLst>
+            </a:blip>
+            <a:srcRect/>
+            <a:stretch>
+              <a:fillRect/>
+            </a:stretch>
+          </p:blipFill>
+          <p:spPr bwMode="auto">
+            <a:xfrm>
+              <a:off x="2133601" y="2264229"/>
+              <a:ext cx="3014968" cy="1905305"/>
+            </a:xfrm>
+            <a:prstGeom prst="rect">
+              <a:avLst/>
+            </a:prstGeom>
+            <a:noFill/>
+            <a:extLst>
+              <a:ext uri="{909E8E84-426E-40DD-AFC4-6F175D3DCCD1}">
+                <a14:hiddenFill xmlns:a14="http://schemas.microsoft.com/office/drawing/2010/main">
+                  <a:solidFill>
+                    <a:srgbClr val="FFFFFF"/>
+                  </a:solidFill>
+                </a14:hiddenFill>
+              </a:ext>
+            </a:extLst>
+          </p:spPr>
+        </p:pic>
+        <p:pic>
+          <p:nvPicPr>
+            <p:cNvPr id="5" name="Picture 4">
+              <a:extLst>
+                <a:ext uri="{FF2B5EF4-FFF2-40B4-BE49-F238E27FC236}">
+                  <a16:creationId xmlns:a16="http://schemas.microsoft.com/office/drawing/2014/main" id="{6BFAA16B-2DBF-9209-1686-AB32D83C4EE3}"/>
+                </a:ext>
+              </a:extLst>
+            </p:cNvPr>
+            <p:cNvPicPr>
+              <a:picLocks noChangeAspect="1"/>
+            </p:cNvPicPr>
+            <p:nvPr/>
+          </p:nvPicPr>
+          <p:blipFill>
+            <a:blip r:embed="rId4"/>
+            <a:stretch>
+              <a:fillRect/>
+            </a:stretch>
+          </p:blipFill>
+          <p:spPr>
+            <a:xfrm>
+              <a:off x="5517244" y="1316866"/>
+              <a:ext cx="3631044" cy="2081892"/>
+            </a:xfrm>
+            <a:prstGeom prst="rect">
+              <a:avLst/>
+            </a:prstGeom>
+          </p:spPr>
+        </p:pic>
+      </p:grpSp>
+      <p:pic>
+        <p:nvPicPr>
+          <p:cNvPr id="3080" name="Picture 8">
+            <a:extLst>
+              <a:ext uri="{FF2B5EF4-FFF2-40B4-BE49-F238E27FC236}">
+                <a16:creationId xmlns:a16="http://schemas.microsoft.com/office/drawing/2014/main" id="{2F5B371F-17E7-E30C-7D82-5F475061CB5D}"/>
+              </a:ext>
+            </a:extLst>
+          </p:cNvPr>
+          <p:cNvPicPr>
+            <a:picLocks noChangeAspect="1" noChangeArrowheads="1"/>
+          </p:cNvPicPr>
+          <p:nvPr/>
+        </p:nvPicPr>
+        <p:blipFill>
+          <a:blip r:embed="rId5">
+            <a:extLst>
+              <a:ext uri="{28A0092B-C50C-407E-A947-70E740481C1C}">
+                <a14:useLocalDpi xmlns:a14="http://schemas.microsoft.com/office/drawing/2010/main" val="0"/>
+              </a:ext>
+            </a:extLst>
+          </a:blip>
+          <a:srcRect/>
+          <a:stretch>
+            <a:fillRect/>
+          </a:stretch>
+        </p:blipFill>
+        <p:spPr bwMode="auto">
+          <a:xfrm>
+            <a:off x="5061155" y="3920825"/>
+            <a:ext cx="5692321" cy="2450946"/>
+          </a:xfrm>
+          <a:prstGeom prst="rect">
+            <a:avLst/>
+          </a:prstGeom>
+          <a:noFill/>
+          <a:extLst>
+            <a:ext uri="{909E8E84-426E-40DD-AFC4-6F175D3DCCD1}">
+              <a14:hiddenFill xmlns:a14="http://schemas.microsoft.com/office/drawing/2010/main">
+                <a:solidFill>
+                  <a:srgbClr val="FFFFFF"/>
+                </a:solidFill>
+              </a14:hiddenFill>
+            </a:ext>
+          </a:extLst>
+        </p:spPr>
+      </p:pic>
+    </p:spTree>
+    <p:extLst>
+      <p:ext uri="{BB962C8B-B14F-4D97-AF65-F5344CB8AC3E}">
+        <p14:creationId xmlns:p14="http://schemas.microsoft.com/office/powerpoint/2010/main" val="3880621108"/>
+      </p:ext>
+    </p:extLst>
+  </p:cSld>
+  <p:clrMapOvr>
+    <a:masterClrMapping/>
+  </p:clrMapOvr>
+</p:sld>
+</file>
+
+<file path=ppt/slides/slide11.xml><?xml version="1.0" encoding="utf-8"?>
+<p:sld xmlns:a="http://schemas.openxmlformats.org/drawingml/2006/main" xmlns:r="http://schemas.openxmlformats.org/officeDocument/2006/relationships" xmlns:p="http://schemas.openxmlformats.org/presentationml/2006/main">
+  <p:cSld>
+    <p:spTree>
+      <p:nvGrpSpPr>
+        <p:cNvPr id="1" name=""/>
+        <p:cNvGrpSpPr/>
+        <p:nvPr/>
+      </p:nvGrpSpPr>
+      <p:grpSpPr>
+        <a:xfrm>
+          <a:off x="0" y="0"/>
+          <a:ext cx="0" cy="0"/>
+          <a:chOff x="0" y="0"/>
+          <a:chExt cx="0" cy="0"/>
+        </a:xfrm>
+      </p:grpSpPr>
+      <p:pic>
+        <p:nvPicPr>
+          <p:cNvPr id="6" name="Picture 5">
+            <a:extLst>
+              <a:ext uri="{FF2B5EF4-FFF2-40B4-BE49-F238E27FC236}">
+                <a16:creationId xmlns:a16="http://schemas.microsoft.com/office/drawing/2014/main" id="{8BBE17F5-7A18-97DD-454A-4E837277F710}"/>
+              </a:ext>
+            </a:extLst>
+          </p:cNvPr>
+          <p:cNvPicPr>
+            <a:picLocks noChangeAspect="1"/>
+          </p:cNvPicPr>
+          <p:nvPr/>
+        </p:nvPicPr>
+        <p:blipFill>
+          <a:blip r:embed="rId2"/>
+          <a:stretch>
+            <a:fillRect/>
+          </a:stretch>
+        </p:blipFill>
+        <p:spPr>
+          <a:xfrm>
+            <a:off x="1132114" y="979338"/>
+            <a:ext cx="7772400" cy="3484179"/>
+          </a:xfrm>
+          <a:prstGeom prst="rect">
+            <a:avLst/>
+          </a:prstGeom>
+          <a:ln>
+            <a:solidFill>
+              <a:schemeClr val="tx1"/>
+            </a:solidFill>
+          </a:ln>
+        </p:spPr>
+      </p:pic>
+    </p:spTree>
+    <p:extLst>
+      <p:ext uri="{BB962C8B-B14F-4D97-AF65-F5344CB8AC3E}">
+        <p14:creationId xmlns:p14="http://schemas.microsoft.com/office/powerpoint/2010/main" val="3514297602"/>
+      </p:ext>
+    </p:extLst>
+  </p:cSld>
+  <p:clrMapOvr>
+    <a:masterClrMapping/>
+  </p:clrMapOvr>
+</p:sld>
+</file>
+
+<file path=ppt/slides/slide2.xml><?xml version="1.0" encoding="utf-8"?>
+<p:sld xmlns:a="http://schemas.openxmlformats.org/drawingml/2006/main" xmlns:r="http://schemas.openxmlformats.org/officeDocument/2006/relationships" xmlns:p="http://schemas.openxmlformats.org/presentationml/2006/main">
+  <p:cSld>
+    <p:spTree>
+      <p:nvGrpSpPr>
+        <p:cNvPr id="1" name=""/>
+        <p:cNvGrpSpPr/>
+        <p:nvPr/>
+      </p:nvGrpSpPr>
+      <p:grpSpPr>
+        <a:xfrm>
+          <a:off x="0" y="0"/>
+          <a:ext cx="0" cy="0"/>
+          <a:chOff x="0" y="0"/>
+          <a:chExt cx="0" cy="0"/>
+        </a:xfrm>
+      </p:grpSpPr>
+      <p:pic>
+        <p:nvPicPr>
+          <p:cNvPr id="7" name="Picture 6">
+            <a:extLst>
+              <a:ext uri="{FF2B5EF4-FFF2-40B4-BE49-F238E27FC236}">
+                <a16:creationId xmlns:a16="http://schemas.microsoft.com/office/drawing/2014/main" id="{BA7E9420-FE21-D9DB-E749-DE9F5771E2C7}"/>
+              </a:ext>
+            </a:extLst>
+          </p:cNvPr>
+          <p:cNvPicPr>
+            <a:picLocks noChangeAspect="1"/>
+          </p:cNvPicPr>
+          <p:nvPr/>
+        </p:nvPicPr>
+        <p:blipFill>
+          <a:blip r:embed="rId2"/>
+          <a:stretch>
+            <a:fillRect/>
+          </a:stretch>
+        </p:blipFill>
+        <p:spPr>
+          <a:xfrm>
+            <a:off x="3907972" y="2800922"/>
+            <a:ext cx="7772400" cy="3186556"/>
+          </a:xfrm>
+          <a:prstGeom prst="rect">
+            <a:avLst/>
+          </a:prstGeom>
+          <a:ln>
+            <a:solidFill>
+              <a:schemeClr val="tx1"/>
+            </a:solidFill>
+          </a:ln>
+        </p:spPr>
+      </p:pic>
+      <p:pic>
+        <p:nvPicPr>
+          <p:cNvPr id="9" name="Picture 8">
+            <a:extLst>
+              <a:ext uri="{FF2B5EF4-FFF2-40B4-BE49-F238E27FC236}">
+                <a16:creationId xmlns:a16="http://schemas.microsoft.com/office/drawing/2014/main" id="{006A55D6-BDF9-819C-5DAC-15B391241708}"/>
+              </a:ext>
+            </a:extLst>
+          </p:cNvPr>
+          <p:cNvPicPr>
+            <a:picLocks noChangeAspect="1"/>
+          </p:cNvPicPr>
+          <p:nvPr/>
+        </p:nvPicPr>
+        <p:blipFill>
+          <a:blip r:embed="rId3"/>
+          <a:stretch>
+            <a:fillRect/>
+          </a:stretch>
+        </p:blipFill>
+        <p:spPr>
+          <a:xfrm>
+            <a:off x="605971" y="261257"/>
+            <a:ext cx="6908800" cy="4394200"/>
+          </a:xfrm>
+          <a:prstGeom prst="rect">
+            <a:avLst/>
+          </a:prstGeom>
+          <a:ln>
+            <a:solidFill>
+              <a:schemeClr val="tx1"/>
+            </a:solidFill>
+          </a:ln>
+        </p:spPr>
+      </p:pic>
+    </p:spTree>
+    <p:extLst>
+      <p:ext uri="{BB962C8B-B14F-4D97-AF65-F5344CB8AC3E}">
+        <p14:creationId xmlns:p14="http://schemas.microsoft.com/office/powerpoint/2010/main" val="3504344482"/>
+      </p:ext>
+    </p:extLst>
+  </p:cSld>
+  <p:clrMapOvr>
+    <a:masterClrMapping/>
+  </p:clrMapOvr>
+</p:sld>
+</file>
+
+<file path=ppt/slides/slide3.xml><?xml version="1.0" encoding="utf-8"?>
+<p:sld xmlns:a="http://schemas.openxmlformats.org/drawingml/2006/main" xmlns:r="http://schemas.openxmlformats.org/officeDocument/2006/relationships" xmlns:p="http://schemas.openxmlformats.org/presentationml/2006/main">
+  <p:cSld>
+    <p:spTree>
+      <p:nvGrpSpPr>
+        <p:cNvPr id="1" name=""/>
+        <p:cNvGrpSpPr/>
+        <p:nvPr/>
+      </p:nvGrpSpPr>
+      <p:grpSpPr>
+        <a:xfrm>
+          <a:off x="0" y="0"/>
+          <a:ext cx="0" cy="0"/>
+          <a:chOff x="0" y="0"/>
+          <a:chExt cx="0" cy="0"/>
+        </a:xfrm>
+      </p:grpSpPr>
+      <p:grpSp>
+        <p:nvGrpSpPr>
+          <p:cNvPr id="4" name="Group 3">
+            <a:extLst>
+              <a:ext uri="{FF2B5EF4-FFF2-40B4-BE49-F238E27FC236}">
+                <a16:creationId xmlns:a16="http://schemas.microsoft.com/office/drawing/2014/main" id="{10A9C3B2-C2A4-2887-8D55-6DBE53996640}"/>
+              </a:ext>
+            </a:extLst>
+          </p:cNvPr>
+          <p:cNvGrpSpPr/>
+          <p:nvPr/>
+        </p:nvGrpSpPr>
+        <p:grpSpPr>
+          <a:xfrm>
+            <a:off x="1828801" y="1664157"/>
+            <a:ext cx="7772400" cy="2772912"/>
+            <a:chOff x="1828801" y="1664157"/>
+            <a:chExt cx="7772400" cy="2772912"/>
+          </a:xfrm>
+        </p:grpSpPr>
+        <p:pic>
+          <p:nvPicPr>
+            <p:cNvPr id="3" name="Picture 2">
+              <a:extLst>
+                <a:ext uri="{FF2B5EF4-FFF2-40B4-BE49-F238E27FC236}">
+                  <a16:creationId xmlns:a16="http://schemas.microsoft.com/office/drawing/2014/main" id="{5A7ACCFD-FB67-BB9D-D314-A55D07AAC648}"/>
+                </a:ext>
+              </a:extLst>
+            </p:cNvPr>
+            <p:cNvPicPr>
+              <a:picLocks noChangeAspect="1"/>
+            </p:cNvPicPr>
+            <p:nvPr/>
+          </p:nvPicPr>
+          <p:blipFill>
+            <a:blip r:embed="rId2"/>
+            <a:stretch>
+              <a:fillRect/>
+            </a:stretch>
+          </p:blipFill>
+          <p:spPr>
+            <a:xfrm>
+              <a:off x="1828801" y="1664157"/>
+              <a:ext cx="7772400" cy="2772912"/>
+            </a:xfrm>
+            <a:prstGeom prst="rect">
+              <a:avLst/>
+            </a:prstGeom>
+            <a:ln>
+              <a:solidFill>
+                <a:schemeClr val="tx1"/>
+              </a:solidFill>
+            </a:ln>
+          </p:spPr>
+        </p:pic>
         <p:grpSp>
           <p:nvGrpSpPr>
-            <p:cNvPr id="4" name="Group 3">
+            <p:cNvPr id="7" name="Group 6">
               <a:extLst>
                 <a:ext uri="{FF2B5EF4-FFF2-40B4-BE49-F238E27FC236}">
-                  <a16:creationId xmlns:a16="http://schemas.microsoft.com/office/drawing/2014/main" id="{017D2604-C607-A9CF-4D90-E7F27C6C29C3}"/>
+                  <a16:creationId xmlns:a16="http://schemas.microsoft.com/office/drawing/2014/main" id="{9953F500-B436-B1B9-AC4F-3EF7CEA27377}"/>
                 </a:ext>
               </a:extLst>
             </p:cNvPr>
@@ -4263,42 +4689,12 @@
           </p:nvGrpSpPr>
           <p:grpSpPr>
             <a:xfrm>
-              <a:off x="1839685" y="1613005"/>
-              <a:ext cx="7772400" cy="2802754"/>
-              <a:chOff x="1839685" y="1613005"/>
-              <a:chExt cx="7772400" cy="2802754"/>
+              <a:off x="2057400" y="2193358"/>
+              <a:ext cx="5421087" cy="2243711"/>
+              <a:chOff x="2057400" y="2193358"/>
+              <a:chExt cx="5421087" cy="2243711"/>
             </a:xfrm>
           </p:grpSpPr>
-          <p:pic>
-            <p:nvPicPr>
-              <p:cNvPr id="3" name="Picture 2">
-                <a:extLst>
-                  <a:ext uri="{FF2B5EF4-FFF2-40B4-BE49-F238E27FC236}">
-                    <a16:creationId xmlns:a16="http://schemas.microsoft.com/office/drawing/2014/main" id="{51FF03C4-D788-18AA-1A66-725B9494A702}"/>
-                  </a:ext>
-                </a:extLst>
-              </p:cNvPr>
-              <p:cNvPicPr>
-                <a:picLocks noChangeAspect="1"/>
-              </p:cNvPicPr>
-              <p:nvPr/>
-            </p:nvPicPr>
-            <p:blipFill>
-              <a:blip r:embed="rId2"/>
-              <a:stretch>
-                <a:fillRect/>
-              </a:stretch>
-            </p:blipFill>
-            <p:spPr>
-              <a:xfrm>
-                <a:off x="1839685" y="1613005"/>
-                <a:ext cx="7772400" cy="2782903"/>
-              </a:xfrm>
-              <a:prstGeom prst="rect">
-                <a:avLst/>
-              </a:prstGeom>
-            </p:spPr>
-          </p:pic>
           <p:sp>
             <p:nvSpPr>
               <p:cNvPr id="6" name="Rounded Rectangle 5">
@@ -4313,7 +4709,7 @@
             </p:nvSpPr>
             <p:spPr>
               <a:xfrm>
-                <a:off x="6662058" y="4233636"/>
+                <a:off x="6607630" y="4254946"/>
                 <a:ext cx="870857" cy="182123"/>
               </a:xfrm>
               <a:prstGeom prst="roundRect">
@@ -4365,7 +4761,7 @@
             </p:nvSpPr>
             <p:spPr>
               <a:xfrm>
-                <a:off x="4528458" y="2900930"/>
+                <a:off x="4484915" y="2900930"/>
                 <a:ext cx="228600" cy="528070"/>
               </a:xfrm>
               <a:prstGeom prst="roundRect">
@@ -4417,8 +4813,60 @@
             </p:nvSpPr>
             <p:spPr>
               <a:xfrm>
-                <a:off x="2057400" y="2193359"/>
-                <a:ext cx="718457" cy="811098"/>
+                <a:off x="2057400" y="2193358"/>
+                <a:ext cx="762000" cy="811098"/>
+              </a:xfrm>
+              <a:prstGeom prst="roundRect">
+                <a:avLst/>
+              </a:prstGeom>
+              <a:noFill/>
+              <a:ln w="38100">
+                <a:solidFill>
+                  <a:srgbClr val="FF0000"/>
+                </a:solidFill>
+              </a:ln>
+            </p:spPr>
+            <p:style>
+              <a:lnRef idx="2">
+                <a:schemeClr val="accent1">
+                  <a:shade val="15000"/>
+                </a:schemeClr>
+              </a:lnRef>
+              <a:fillRef idx="1">
+                <a:schemeClr val="accent1"/>
+              </a:fillRef>
+              <a:effectRef idx="0">
+                <a:schemeClr val="accent1"/>
+              </a:effectRef>
+              <a:fontRef idx="minor">
+                <a:schemeClr val="lt1"/>
+              </a:fontRef>
+            </p:style>
+            <p:txBody>
+              <a:bodyPr rtlCol="0" anchor="ctr"/>
+              <a:lstStyle/>
+              <a:p>
+                <a:pPr algn="ctr"/>
+                <a:endParaRPr lang="en-US"/>
+              </a:p>
+            </p:txBody>
+          </p:sp>
+          <p:sp>
+            <p:nvSpPr>
+              <p:cNvPr id="15" name="Rounded Rectangle 14">
+                <a:extLst>
+                  <a:ext uri="{FF2B5EF4-FFF2-40B4-BE49-F238E27FC236}">
+                    <a16:creationId xmlns:a16="http://schemas.microsoft.com/office/drawing/2014/main" id="{0D99B2F0-65D8-6C19-22DD-0F8BD6DE3788}"/>
+                  </a:ext>
+                </a:extLst>
+              </p:cNvPr>
+              <p:cNvSpPr/>
+              <p:nvPr/>
+            </p:nvSpPr>
+            <p:spPr>
+              <a:xfrm>
+                <a:off x="2057400" y="3004456"/>
+                <a:ext cx="859971" cy="239487"/>
               </a:xfrm>
               <a:prstGeom prst="roundRect">
                 <a:avLst/>
@@ -4456,58 +4904,6 @@
             </p:txBody>
           </p:sp>
         </p:grpSp>
-        <p:sp>
-          <p:nvSpPr>
-            <p:cNvPr id="15" name="Rounded Rectangle 14">
-              <a:extLst>
-                <a:ext uri="{FF2B5EF4-FFF2-40B4-BE49-F238E27FC236}">
-                  <a16:creationId xmlns:a16="http://schemas.microsoft.com/office/drawing/2014/main" id="{0D99B2F0-65D8-6C19-22DD-0F8BD6DE3788}"/>
-                </a:ext>
-              </a:extLst>
-            </p:cNvPr>
-            <p:cNvSpPr/>
-            <p:nvPr/>
-          </p:nvSpPr>
-          <p:spPr>
-            <a:xfrm>
-              <a:off x="2057400" y="3004456"/>
-              <a:ext cx="859971" cy="239487"/>
-            </a:xfrm>
-            <a:prstGeom prst="roundRect">
-              <a:avLst/>
-            </a:prstGeom>
-            <a:noFill/>
-            <a:ln w="38100">
-              <a:solidFill>
-                <a:srgbClr val="FF0000"/>
-              </a:solidFill>
-            </a:ln>
-          </p:spPr>
-          <p:style>
-            <a:lnRef idx="2">
-              <a:schemeClr val="accent1">
-                <a:shade val="15000"/>
-              </a:schemeClr>
-            </a:lnRef>
-            <a:fillRef idx="1">
-              <a:schemeClr val="accent1"/>
-            </a:fillRef>
-            <a:effectRef idx="0">
-              <a:schemeClr val="accent1"/>
-            </a:effectRef>
-            <a:fontRef idx="minor">
-              <a:schemeClr val="lt1"/>
-            </a:fontRef>
-          </p:style>
-          <p:txBody>
-            <a:bodyPr rtlCol="0" anchor="ctr"/>
-            <a:lstStyle/>
-            <a:p>
-              <a:pPr algn="ctr"/>
-              <a:endParaRPr lang="en-US"/>
-            </a:p>
-          </p:txBody>
-        </p:sp>
       </p:grpSp>
     </p:spTree>
     <p:extLst>
@@ -4522,7 +4918,7 @@
 </p:sld>
 </file>
 
-<file path=ppt/slides/slide3.xml><?xml version="1.0" encoding="utf-8"?>
+<file path=ppt/slides/slide4.xml><?xml version="1.0" encoding="utf-8"?>
 <p:sld xmlns:a="http://schemas.openxmlformats.org/drawingml/2006/main" xmlns:r="http://schemas.openxmlformats.org/officeDocument/2006/relationships" xmlns:p="http://schemas.openxmlformats.org/presentationml/2006/main">
   <p:cSld>
     <p:spTree>
@@ -4541,10 +4937,10 @@
       </p:grpSpPr>
       <p:grpSp>
         <p:nvGrpSpPr>
-          <p:cNvPr id="11" name="Group 10">
-            <a:extLst>
-              <a:ext uri="{FF2B5EF4-FFF2-40B4-BE49-F238E27FC236}">
-                <a16:creationId xmlns:a16="http://schemas.microsoft.com/office/drawing/2014/main" id="{6739DDF6-535C-5547-26FD-F4E9DFD7B0AE}"/>
+          <p:cNvPr id="4" name="Group 3">
+            <a:extLst>
+              <a:ext uri="{FF2B5EF4-FFF2-40B4-BE49-F238E27FC236}">
+                <a16:creationId xmlns:a16="http://schemas.microsoft.com/office/drawing/2014/main" id="{9215F674-8B77-FB31-643D-BDAE810DDB4B}"/>
               </a:ext>
             </a:extLst>
           </p:cNvPr>
@@ -4553,18 +4949,53 @@
         </p:nvGrpSpPr>
         <p:grpSpPr>
           <a:xfrm>
-            <a:off x="1828800" y="1613005"/>
-            <a:ext cx="7772400" cy="2802754"/>
-            <a:chOff x="1828800" y="1613005"/>
-            <a:chExt cx="7772400" cy="2802754"/>
+            <a:off x="1817914" y="1642847"/>
+            <a:ext cx="7772400" cy="2772912"/>
+            <a:chOff x="1817914" y="1642847"/>
+            <a:chExt cx="7772400" cy="2772912"/>
           </a:xfrm>
         </p:grpSpPr>
+        <p:pic>
+          <p:nvPicPr>
+            <p:cNvPr id="3" name="Picture 2">
+              <a:extLst>
+                <a:ext uri="{FF2B5EF4-FFF2-40B4-BE49-F238E27FC236}">
+                  <a16:creationId xmlns:a16="http://schemas.microsoft.com/office/drawing/2014/main" id="{555A257C-D52B-2723-8DC9-80F49C11CABE}"/>
+                </a:ext>
+              </a:extLst>
+            </p:cNvPr>
+            <p:cNvPicPr>
+              <a:picLocks noChangeAspect="1"/>
+            </p:cNvPicPr>
+            <p:nvPr/>
+          </p:nvPicPr>
+          <p:blipFill>
+            <a:blip r:embed="rId2"/>
+            <a:stretch>
+              <a:fillRect/>
+            </a:stretch>
+          </p:blipFill>
+          <p:spPr>
+            <a:xfrm>
+              <a:off x="1817914" y="1642847"/>
+              <a:ext cx="7772400" cy="2772912"/>
+            </a:xfrm>
+            <a:prstGeom prst="rect">
+              <a:avLst/>
+            </a:prstGeom>
+            <a:ln>
+              <a:solidFill>
+                <a:schemeClr val="tx1"/>
+              </a:solidFill>
+            </a:ln>
+          </p:spPr>
+        </p:pic>
         <p:grpSp>
           <p:nvGrpSpPr>
-            <p:cNvPr id="7" name="Group 6">
+            <p:cNvPr id="11" name="Group 10">
               <a:extLst>
                 <a:ext uri="{FF2B5EF4-FFF2-40B4-BE49-F238E27FC236}">
-                  <a16:creationId xmlns:a16="http://schemas.microsoft.com/office/drawing/2014/main" id="{5482E23D-E368-9B28-800D-EDA604A39048}"/>
+                  <a16:creationId xmlns:a16="http://schemas.microsoft.com/office/drawing/2014/main" id="{6739DDF6-535C-5547-26FD-F4E9DFD7B0AE}"/>
                 </a:ext>
               </a:extLst>
             </p:cNvPr>
@@ -4573,48 +5004,195 @@
           </p:nvGrpSpPr>
           <p:grpSpPr>
             <a:xfrm>
-              <a:off x="1828800" y="1613005"/>
-              <a:ext cx="7772400" cy="2802754"/>
-              <a:chOff x="1828800" y="1613005"/>
-              <a:chExt cx="7772400" cy="2802754"/>
+              <a:off x="2057400" y="2193359"/>
+              <a:ext cx="5453743" cy="2222400"/>
+              <a:chOff x="2057400" y="2193359"/>
+              <a:chExt cx="5453743" cy="2222400"/>
             </a:xfrm>
           </p:grpSpPr>
-          <p:pic>
-            <p:nvPicPr>
-              <p:cNvPr id="5" name="Picture 4">
+          <p:grpSp>
+            <p:nvGrpSpPr>
+              <p:cNvPr id="7" name="Group 6">
                 <a:extLst>
                   <a:ext uri="{FF2B5EF4-FFF2-40B4-BE49-F238E27FC236}">
-                    <a16:creationId xmlns:a16="http://schemas.microsoft.com/office/drawing/2014/main" id="{1CE759A5-9056-63D0-73E1-35EFE0FBEED4}"/>
+                    <a16:creationId xmlns:a16="http://schemas.microsoft.com/office/drawing/2014/main" id="{5482E23D-E368-9B28-800D-EDA604A39048}"/>
                   </a:ext>
                 </a:extLst>
               </p:cNvPr>
-              <p:cNvPicPr>
-                <a:picLocks noChangeAspect="1"/>
-              </p:cNvPicPr>
+              <p:cNvGrpSpPr/>
               <p:nvPr/>
-            </p:nvPicPr>
-            <p:blipFill>
-              <a:blip r:embed="rId2"/>
-              <a:stretch>
-                <a:fillRect/>
-              </a:stretch>
-            </p:blipFill>
-            <p:spPr>
+            </p:nvGrpSpPr>
+            <p:grpSpPr>
               <a:xfrm>
-                <a:off x="1828800" y="1613005"/>
-                <a:ext cx="7772400" cy="2782903"/>
+                <a:off x="2057400" y="2193359"/>
+                <a:ext cx="5453743" cy="2222400"/>
+                <a:chOff x="2057400" y="2193359"/>
+                <a:chExt cx="5453743" cy="2222400"/>
               </a:xfrm>
-              <a:prstGeom prst="rect">
-                <a:avLst/>
-              </a:prstGeom>
-            </p:spPr>
-          </p:pic>
+            </p:grpSpPr>
+            <p:sp>
+              <p:nvSpPr>
+                <p:cNvPr id="6" name="Rounded Rectangle 5">
+                  <a:extLst>
+                    <a:ext uri="{FF2B5EF4-FFF2-40B4-BE49-F238E27FC236}">
+                      <a16:creationId xmlns:a16="http://schemas.microsoft.com/office/drawing/2014/main" id="{C42A30C7-5411-DBC8-9A05-0E6EAFDF748C}"/>
+                    </a:ext>
+                  </a:extLst>
+                </p:cNvPr>
+                <p:cNvSpPr/>
+                <p:nvPr/>
+              </p:nvSpPr>
+              <p:spPr>
+                <a:xfrm>
+                  <a:off x="6640286" y="4233636"/>
+                  <a:ext cx="870857" cy="182123"/>
+                </a:xfrm>
+                <a:prstGeom prst="roundRect">
+                  <a:avLst/>
+                </a:prstGeom>
+                <a:noFill/>
+                <a:ln w="38100">
+                  <a:solidFill>
+                    <a:srgbClr val="00B050"/>
+                  </a:solidFill>
+                </a:ln>
+              </p:spPr>
+              <p:style>
+                <a:lnRef idx="2">
+                  <a:schemeClr val="accent1">
+                    <a:shade val="15000"/>
+                  </a:schemeClr>
+                </a:lnRef>
+                <a:fillRef idx="1">
+                  <a:schemeClr val="accent1"/>
+                </a:fillRef>
+                <a:effectRef idx="0">
+                  <a:schemeClr val="accent1"/>
+                </a:effectRef>
+                <a:fontRef idx="minor">
+                  <a:schemeClr val="lt1"/>
+                </a:fontRef>
+              </p:style>
+              <p:txBody>
+                <a:bodyPr rtlCol="0" anchor="ctr"/>
+                <a:lstStyle/>
+                <a:p>
+                  <a:pPr algn="ctr"/>
+                  <a:endParaRPr lang="en-US"/>
+                </a:p>
+              </p:txBody>
+            </p:sp>
+            <p:sp>
+              <p:nvSpPr>
+                <p:cNvPr id="8" name="Rounded Rectangle 7">
+                  <a:extLst>
+                    <a:ext uri="{FF2B5EF4-FFF2-40B4-BE49-F238E27FC236}">
+                      <a16:creationId xmlns:a16="http://schemas.microsoft.com/office/drawing/2014/main" id="{51AE23C8-1902-DD9C-16D7-B1404444E176}"/>
+                    </a:ext>
+                  </a:extLst>
+                </p:cNvPr>
+                <p:cNvSpPr/>
+                <p:nvPr/>
+              </p:nvSpPr>
+              <p:spPr>
+                <a:xfrm>
+                  <a:off x="4463144" y="2900930"/>
+                  <a:ext cx="228600" cy="528070"/>
+                </a:xfrm>
+                <a:prstGeom prst="roundRect">
+                  <a:avLst/>
+                </a:prstGeom>
+                <a:noFill/>
+                <a:ln w="38100">
+                  <a:solidFill>
+                    <a:srgbClr val="00B050"/>
+                  </a:solidFill>
+                </a:ln>
+              </p:spPr>
+              <p:style>
+                <a:lnRef idx="2">
+                  <a:schemeClr val="accent1">
+                    <a:shade val="15000"/>
+                  </a:schemeClr>
+                </a:lnRef>
+                <a:fillRef idx="1">
+                  <a:schemeClr val="accent1"/>
+                </a:fillRef>
+                <a:effectRef idx="0">
+                  <a:schemeClr val="accent1"/>
+                </a:effectRef>
+                <a:fontRef idx="minor">
+                  <a:schemeClr val="lt1"/>
+                </a:fontRef>
+              </p:style>
+              <p:txBody>
+                <a:bodyPr rtlCol="0" anchor="ctr"/>
+                <a:lstStyle/>
+                <a:p>
+                  <a:pPr algn="ctr"/>
+                  <a:endParaRPr lang="en-US" dirty="0"/>
+                </a:p>
+              </p:txBody>
+            </p:sp>
+            <p:sp>
+              <p:nvSpPr>
+                <p:cNvPr id="9" name="Rounded Rectangle 8">
+                  <a:extLst>
+                    <a:ext uri="{FF2B5EF4-FFF2-40B4-BE49-F238E27FC236}">
+                      <a16:creationId xmlns:a16="http://schemas.microsoft.com/office/drawing/2014/main" id="{5A661353-352D-4A2E-F583-131FC28826EC}"/>
+                    </a:ext>
+                  </a:extLst>
+                </p:cNvPr>
+                <p:cNvSpPr/>
+                <p:nvPr/>
+              </p:nvSpPr>
+              <p:spPr>
+                <a:xfrm>
+                  <a:off x="2057400" y="2193359"/>
+                  <a:ext cx="762000" cy="811098"/>
+                </a:xfrm>
+                <a:prstGeom prst="roundRect">
+                  <a:avLst/>
+                </a:prstGeom>
+                <a:noFill/>
+                <a:ln w="38100">
+                  <a:solidFill>
+                    <a:srgbClr val="00B050"/>
+                  </a:solidFill>
+                </a:ln>
+              </p:spPr>
+              <p:style>
+                <a:lnRef idx="2">
+                  <a:schemeClr val="accent1">
+                    <a:shade val="15000"/>
+                  </a:schemeClr>
+                </a:lnRef>
+                <a:fillRef idx="1">
+                  <a:schemeClr val="accent1"/>
+                </a:fillRef>
+                <a:effectRef idx="0">
+                  <a:schemeClr val="accent1"/>
+                </a:effectRef>
+                <a:fontRef idx="minor">
+                  <a:schemeClr val="lt1"/>
+                </a:fontRef>
+              </p:style>
+              <p:txBody>
+                <a:bodyPr rtlCol="0" anchor="ctr"/>
+                <a:lstStyle/>
+                <a:p>
+                  <a:pPr algn="ctr"/>
+                  <a:endParaRPr lang="en-US"/>
+                </a:p>
+              </p:txBody>
+            </p:sp>
+          </p:grpSp>
           <p:sp>
             <p:nvSpPr>
-              <p:cNvPr id="6" name="Rounded Rectangle 5">
+              <p:cNvPr id="10" name="Rounded Rectangle 9">
                 <a:extLst>
                   <a:ext uri="{FF2B5EF4-FFF2-40B4-BE49-F238E27FC236}">
-                    <a16:creationId xmlns:a16="http://schemas.microsoft.com/office/drawing/2014/main" id="{C42A30C7-5411-DBC8-9A05-0E6EAFDF748C}"/>
+                    <a16:creationId xmlns:a16="http://schemas.microsoft.com/office/drawing/2014/main" id="{0DC38D91-31BC-3D43-FA6F-DB8041C43DF2}"/>
                   </a:ext>
                 </a:extLst>
               </p:cNvPr>
@@ -4623,8 +5201,8 @@
             </p:nvSpPr>
             <p:spPr>
               <a:xfrm>
-                <a:off x="6662058" y="4233636"/>
-                <a:ext cx="870857" cy="182123"/>
+                <a:off x="2057400" y="3004456"/>
+                <a:ext cx="859971" cy="239487"/>
               </a:xfrm>
               <a:prstGeom prst="roundRect">
                 <a:avLst/>
@@ -4632,111 +5210,7 @@
               <a:noFill/>
               <a:ln w="38100">
                 <a:solidFill>
-                  <a:srgbClr val="00B050"/>
-                </a:solidFill>
-              </a:ln>
-            </p:spPr>
-            <p:style>
-              <a:lnRef idx="2">
-                <a:schemeClr val="accent1">
-                  <a:shade val="15000"/>
-                </a:schemeClr>
-              </a:lnRef>
-              <a:fillRef idx="1">
-                <a:schemeClr val="accent1"/>
-              </a:fillRef>
-              <a:effectRef idx="0">
-                <a:schemeClr val="accent1"/>
-              </a:effectRef>
-              <a:fontRef idx="minor">
-                <a:schemeClr val="lt1"/>
-              </a:fontRef>
-            </p:style>
-            <p:txBody>
-              <a:bodyPr rtlCol="0" anchor="ctr"/>
-              <a:lstStyle/>
-              <a:p>
-                <a:pPr algn="ctr"/>
-                <a:endParaRPr lang="en-US"/>
-              </a:p>
-            </p:txBody>
-          </p:sp>
-          <p:sp>
-            <p:nvSpPr>
-              <p:cNvPr id="8" name="Rounded Rectangle 7">
-                <a:extLst>
-                  <a:ext uri="{FF2B5EF4-FFF2-40B4-BE49-F238E27FC236}">
-                    <a16:creationId xmlns:a16="http://schemas.microsoft.com/office/drawing/2014/main" id="{51AE23C8-1902-DD9C-16D7-B1404444E176}"/>
-                  </a:ext>
-                </a:extLst>
-              </p:cNvPr>
-              <p:cNvSpPr/>
-              <p:nvPr/>
-            </p:nvSpPr>
-            <p:spPr>
-              <a:xfrm>
-                <a:off x="4528458" y="2900930"/>
-                <a:ext cx="228600" cy="528070"/>
-              </a:xfrm>
-              <a:prstGeom prst="roundRect">
-                <a:avLst/>
-              </a:prstGeom>
-              <a:noFill/>
-              <a:ln w="38100">
-                <a:solidFill>
-                  <a:srgbClr val="00B050"/>
-                </a:solidFill>
-              </a:ln>
-            </p:spPr>
-            <p:style>
-              <a:lnRef idx="2">
-                <a:schemeClr val="accent1">
-                  <a:shade val="15000"/>
-                </a:schemeClr>
-              </a:lnRef>
-              <a:fillRef idx="1">
-                <a:schemeClr val="accent1"/>
-              </a:fillRef>
-              <a:effectRef idx="0">
-                <a:schemeClr val="accent1"/>
-              </a:effectRef>
-              <a:fontRef idx="minor">
-                <a:schemeClr val="lt1"/>
-              </a:fontRef>
-            </p:style>
-            <p:txBody>
-              <a:bodyPr rtlCol="0" anchor="ctr"/>
-              <a:lstStyle/>
-              <a:p>
-                <a:pPr algn="ctr"/>
-                <a:endParaRPr lang="en-US"/>
-              </a:p>
-            </p:txBody>
-          </p:sp>
-          <p:sp>
-            <p:nvSpPr>
-              <p:cNvPr id="9" name="Rounded Rectangle 8">
-                <a:extLst>
-                  <a:ext uri="{FF2B5EF4-FFF2-40B4-BE49-F238E27FC236}">
-                    <a16:creationId xmlns:a16="http://schemas.microsoft.com/office/drawing/2014/main" id="{5A661353-352D-4A2E-F583-131FC28826EC}"/>
-                  </a:ext>
-                </a:extLst>
-              </p:cNvPr>
-              <p:cNvSpPr/>
-              <p:nvPr/>
-            </p:nvSpPr>
-            <p:spPr>
-              <a:xfrm>
-                <a:off x="2057400" y="2193359"/>
-                <a:ext cx="718457" cy="811098"/>
-              </a:xfrm>
-              <a:prstGeom prst="roundRect">
-                <a:avLst/>
-              </a:prstGeom>
-              <a:noFill/>
-              <a:ln w="38100">
-                <a:solidFill>
-                  <a:srgbClr val="00B050"/>
+                  <a:srgbClr val="FF0000"/>
                 </a:solidFill>
               </a:ln>
             </p:spPr>
@@ -4766,58 +5240,6 @@
             </p:txBody>
           </p:sp>
         </p:grpSp>
-        <p:sp>
-          <p:nvSpPr>
-            <p:cNvPr id="10" name="Rounded Rectangle 9">
-              <a:extLst>
-                <a:ext uri="{FF2B5EF4-FFF2-40B4-BE49-F238E27FC236}">
-                  <a16:creationId xmlns:a16="http://schemas.microsoft.com/office/drawing/2014/main" id="{0DC38D91-31BC-3D43-FA6F-DB8041C43DF2}"/>
-                </a:ext>
-              </a:extLst>
-            </p:cNvPr>
-            <p:cNvSpPr/>
-            <p:nvPr/>
-          </p:nvSpPr>
-          <p:spPr>
-            <a:xfrm>
-              <a:off x="2057400" y="3004456"/>
-              <a:ext cx="859971" cy="239487"/>
-            </a:xfrm>
-            <a:prstGeom prst="roundRect">
-              <a:avLst/>
-            </a:prstGeom>
-            <a:noFill/>
-            <a:ln w="38100">
-              <a:solidFill>
-                <a:srgbClr val="FF0000"/>
-              </a:solidFill>
-            </a:ln>
-          </p:spPr>
-          <p:style>
-            <a:lnRef idx="2">
-              <a:schemeClr val="accent1">
-                <a:shade val="15000"/>
-              </a:schemeClr>
-            </a:lnRef>
-            <a:fillRef idx="1">
-              <a:schemeClr val="accent1"/>
-            </a:fillRef>
-            <a:effectRef idx="0">
-              <a:schemeClr val="accent1"/>
-            </a:effectRef>
-            <a:fontRef idx="minor">
-              <a:schemeClr val="lt1"/>
-            </a:fontRef>
-          </p:style>
-          <p:txBody>
-            <a:bodyPr rtlCol="0" anchor="ctr"/>
-            <a:lstStyle/>
-            <a:p>
-              <a:pPr algn="ctr"/>
-              <a:endParaRPr lang="en-US"/>
-            </a:p>
-          </p:txBody>
-        </p:sp>
       </p:grpSp>
     </p:spTree>
     <p:extLst>
@@ -4832,7 +5254,7 @@
 </p:sld>
 </file>
 
-<file path=ppt/slides/slide4.xml><?xml version="1.0" encoding="utf-8"?>
+<file path=ppt/slides/slide5.xml><?xml version="1.0" encoding="utf-8"?>
 <p:sld xmlns:a="http://schemas.openxmlformats.org/drawingml/2006/main" xmlns:r="http://schemas.openxmlformats.org/officeDocument/2006/relationships" xmlns:p="http://schemas.openxmlformats.org/presentationml/2006/main">
   <p:cSld>
     <p:spTree>
@@ -4851,10 +5273,10 @@
       </p:grpSpPr>
       <p:grpSp>
         <p:nvGrpSpPr>
-          <p:cNvPr id="14" name="Group 13">
-            <a:extLst>
-              <a:ext uri="{FF2B5EF4-FFF2-40B4-BE49-F238E27FC236}">
-                <a16:creationId xmlns:a16="http://schemas.microsoft.com/office/drawing/2014/main" id="{84A724D8-3349-EBD9-3AA5-9A6C7A858F84}"/>
+          <p:cNvPr id="11" name="Group 10">
+            <a:extLst>
+              <a:ext uri="{FF2B5EF4-FFF2-40B4-BE49-F238E27FC236}">
+                <a16:creationId xmlns:a16="http://schemas.microsoft.com/office/drawing/2014/main" id="{86409B92-2A92-50F7-0EB1-F606CE46F045}"/>
               </a:ext>
             </a:extLst>
           </p:cNvPr>
@@ -4863,18 +5285,18 @@
         </p:nvGrpSpPr>
         <p:grpSpPr>
           <a:xfrm>
-            <a:off x="653142" y="1014290"/>
-            <a:ext cx="8806543" cy="4618748"/>
-            <a:chOff x="653142" y="1014290"/>
-            <a:chExt cx="8806543" cy="4618748"/>
+            <a:off x="740229" y="1881568"/>
+            <a:ext cx="9884228" cy="4159368"/>
+            <a:chOff x="740229" y="1881568"/>
+            <a:chExt cx="9884228" cy="4159368"/>
           </a:xfrm>
         </p:grpSpPr>
         <p:pic>
           <p:nvPicPr>
-            <p:cNvPr id="13" name="Picture 12">
+            <p:cNvPr id="4" name="Picture 3">
               <a:extLst>
                 <a:ext uri="{FF2B5EF4-FFF2-40B4-BE49-F238E27FC236}">
-                  <a16:creationId xmlns:a16="http://schemas.microsoft.com/office/drawing/2014/main" id="{EBAB4D6D-2131-C40E-9D57-461C76611D71}"/>
+                  <a16:creationId xmlns:a16="http://schemas.microsoft.com/office/drawing/2014/main" id="{B9FC6B43-305A-9144-CFBD-8116F26CC6DC}"/>
                 </a:ext>
               </a:extLst>
             </p:cNvPr>
@@ -4891,8 +5313,8 @@
           </p:blipFill>
           <p:spPr>
             <a:xfrm>
-              <a:off x="1687285" y="2850135"/>
-              <a:ext cx="7772400" cy="2782903"/>
+              <a:off x="2852057" y="3268024"/>
+              <a:ext cx="7772400" cy="2772912"/>
             </a:xfrm>
             <a:prstGeom prst="rect">
               <a:avLst/>
@@ -4906,10 +5328,10 @@
         </p:pic>
         <p:pic>
           <p:nvPicPr>
-            <p:cNvPr id="5" name="Picture 4">
+            <p:cNvPr id="10" name="Picture 9">
               <a:extLst>
                 <a:ext uri="{FF2B5EF4-FFF2-40B4-BE49-F238E27FC236}">
-                  <a16:creationId xmlns:a16="http://schemas.microsoft.com/office/drawing/2014/main" id="{11B70543-9670-2485-B43A-3B75C3AC47D2}"/>
+                  <a16:creationId xmlns:a16="http://schemas.microsoft.com/office/drawing/2014/main" id="{DBA4177C-0D89-FF92-20DA-35B812570E66}"/>
                 </a:ext>
               </a:extLst>
             </p:cNvPr>
@@ -4926,8 +5348,8 @@
           </p:blipFill>
           <p:spPr>
             <a:xfrm>
-              <a:off x="653142" y="1014290"/>
-              <a:ext cx="7772400" cy="2782903"/>
+              <a:off x="740229" y="1881568"/>
+              <a:ext cx="7772400" cy="2772912"/>
             </a:xfrm>
             <a:prstGeom prst="rect">
               <a:avLst/>
@@ -4953,7 +5375,170 @@
 </p:sld>
 </file>
 
-<file path=ppt/slides/slide5.xml><?xml version="1.0" encoding="utf-8"?>
+<file path=ppt/slides/slide6.xml><?xml version="1.0" encoding="utf-8"?>
+<p:sld xmlns:a="http://schemas.openxmlformats.org/drawingml/2006/main" xmlns:r="http://schemas.openxmlformats.org/officeDocument/2006/relationships" xmlns:p="http://schemas.openxmlformats.org/presentationml/2006/main">
+  <p:cSld>
+    <p:spTree>
+      <p:nvGrpSpPr>
+        <p:cNvPr id="1" name=""/>
+        <p:cNvGrpSpPr/>
+        <p:nvPr/>
+      </p:nvGrpSpPr>
+      <p:grpSpPr>
+        <a:xfrm>
+          <a:off x="0" y="0"/>
+          <a:ext cx="0" cy="0"/>
+          <a:chOff x="0" y="0"/>
+          <a:chExt cx="0" cy="0"/>
+        </a:xfrm>
+      </p:grpSpPr>
+      <p:pic>
+        <p:nvPicPr>
+          <p:cNvPr id="5" name="Picture 4">
+            <a:extLst>
+              <a:ext uri="{FF2B5EF4-FFF2-40B4-BE49-F238E27FC236}">
+                <a16:creationId xmlns:a16="http://schemas.microsoft.com/office/drawing/2014/main" id="{A00D073C-FDFA-81F6-0841-73A89DCFDFA8}"/>
+              </a:ext>
+            </a:extLst>
+          </p:cNvPr>
+          <p:cNvPicPr>
+            <a:picLocks noChangeAspect="1"/>
+          </p:cNvPicPr>
+          <p:nvPr/>
+        </p:nvPicPr>
+        <p:blipFill rotWithShape="1">
+          <a:blip r:embed="rId2"/>
+          <a:srcRect t="253"/>
+          <a:stretch/>
+        </p:blipFill>
+        <p:spPr>
+          <a:xfrm>
+            <a:off x="751114" y="653143"/>
+            <a:ext cx="7772400" cy="2775857"/>
+          </a:xfrm>
+          <a:prstGeom prst="rect">
+            <a:avLst/>
+          </a:prstGeom>
+          <a:ln>
+            <a:solidFill>
+              <a:schemeClr val="tx1"/>
+            </a:solidFill>
+          </a:ln>
+        </p:spPr>
+      </p:pic>
+      <p:pic>
+        <p:nvPicPr>
+          <p:cNvPr id="7" name="Picture 6">
+            <a:extLst>
+              <a:ext uri="{FF2B5EF4-FFF2-40B4-BE49-F238E27FC236}">
+                <a16:creationId xmlns:a16="http://schemas.microsoft.com/office/drawing/2014/main" id="{05092511-23FF-BC0A-3E7B-03263EEAF3AF}"/>
+              </a:ext>
+            </a:extLst>
+          </p:cNvPr>
+          <p:cNvPicPr>
+            <a:picLocks noChangeAspect="1"/>
+          </p:cNvPicPr>
+          <p:nvPr/>
+        </p:nvPicPr>
+        <p:blipFill rotWithShape="1">
+          <a:blip r:embed="rId3"/>
+          <a:srcRect t="253"/>
+          <a:stretch/>
+        </p:blipFill>
+        <p:spPr>
+          <a:xfrm>
+            <a:off x="2111828" y="3572033"/>
+            <a:ext cx="7772400" cy="2775857"/>
+          </a:xfrm>
+          <a:prstGeom prst="rect">
+            <a:avLst/>
+          </a:prstGeom>
+          <a:ln>
+            <a:solidFill>
+              <a:schemeClr val="tx1"/>
+            </a:solidFill>
+          </a:ln>
+        </p:spPr>
+      </p:pic>
+    </p:spTree>
+    <p:extLst>
+      <p:ext uri="{BB962C8B-B14F-4D97-AF65-F5344CB8AC3E}">
+        <p14:creationId xmlns:p14="http://schemas.microsoft.com/office/powerpoint/2010/main" val="4134384981"/>
+      </p:ext>
+    </p:extLst>
+  </p:cSld>
+  <p:clrMapOvr>
+    <a:masterClrMapping/>
+  </p:clrMapOvr>
+</p:sld>
+</file>
+
+<file path=ppt/slides/slide7.xml><?xml version="1.0" encoding="utf-8"?>
+<p:sld xmlns:a="http://schemas.openxmlformats.org/drawingml/2006/main" xmlns:r="http://schemas.openxmlformats.org/officeDocument/2006/relationships" xmlns:p="http://schemas.openxmlformats.org/presentationml/2006/main">
+  <p:cSld>
+    <p:spTree>
+      <p:nvGrpSpPr>
+        <p:cNvPr id="1" name=""/>
+        <p:cNvGrpSpPr/>
+        <p:nvPr/>
+      </p:nvGrpSpPr>
+      <p:grpSpPr>
+        <a:xfrm>
+          <a:off x="0" y="0"/>
+          <a:ext cx="0" cy="0"/>
+          <a:chOff x="0" y="0"/>
+          <a:chExt cx="0" cy="0"/>
+        </a:xfrm>
+      </p:grpSpPr>
+      <p:pic>
+        <p:nvPicPr>
+          <p:cNvPr id="5" name="Picture 4">
+            <a:extLst>
+              <a:ext uri="{FF2B5EF4-FFF2-40B4-BE49-F238E27FC236}">
+                <a16:creationId xmlns:a16="http://schemas.microsoft.com/office/drawing/2014/main" id="{71558FCE-9D2E-E556-99AA-3314A1D7E7F5}"/>
+              </a:ext>
+            </a:extLst>
+          </p:cNvPr>
+          <p:cNvPicPr>
+            <a:picLocks noChangeAspect="1"/>
+          </p:cNvPicPr>
+          <p:nvPr/>
+        </p:nvPicPr>
+        <p:blipFill>
+          <a:blip r:embed="rId2"/>
+          <a:stretch>
+            <a:fillRect/>
+          </a:stretch>
+        </p:blipFill>
+        <p:spPr>
+          <a:xfrm>
+            <a:off x="1393372" y="1387844"/>
+            <a:ext cx="7772400" cy="2782903"/>
+          </a:xfrm>
+          <a:prstGeom prst="rect">
+            <a:avLst/>
+          </a:prstGeom>
+          <a:ln>
+            <a:solidFill>
+              <a:schemeClr val="tx1"/>
+            </a:solidFill>
+          </a:ln>
+        </p:spPr>
+      </p:pic>
+    </p:spTree>
+    <p:extLst>
+      <p:ext uri="{BB962C8B-B14F-4D97-AF65-F5344CB8AC3E}">
+        <p14:creationId xmlns:p14="http://schemas.microsoft.com/office/powerpoint/2010/main" val="3821308686"/>
+      </p:ext>
+    </p:extLst>
+  </p:cSld>
+  <p:clrMapOvr>
+    <a:masterClrMapping/>
+  </p:clrMapOvr>
+</p:sld>
+</file>
+
+<file path=ppt/slides/slide8.xml><?xml version="1.0" encoding="utf-8"?>
 <p:sld xmlns:a="http://schemas.openxmlformats.org/drawingml/2006/main" xmlns:r="http://schemas.openxmlformats.org/officeDocument/2006/relationships" xmlns:p="http://schemas.openxmlformats.org/presentationml/2006/main">
   <p:cSld>
     <p:spTree>
@@ -5251,7 +5836,7 @@
 </p:sld>
 </file>
 
-<file path=ppt/slides/slide6.xml><?xml version="1.0" encoding="utf-8"?>
+<file path=ppt/slides/slide9.xml><?xml version="1.0" encoding="utf-8"?>
 <p:sld xmlns:a="http://schemas.openxmlformats.org/drawingml/2006/main" xmlns:r="http://schemas.openxmlformats.org/officeDocument/2006/relationships" xmlns:p="http://schemas.openxmlformats.org/presentationml/2006/main">
   <p:cSld>
     <p:spTree>
@@ -5270,10 +5855,10 @@
       </p:grpSpPr>
       <p:grpSp>
         <p:nvGrpSpPr>
-          <p:cNvPr id="9" name="Group 8">
-            <a:extLst>
-              <a:ext uri="{FF2B5EF4-FFF2-40B4-BE49-F238E27FC236}">
-                <a16:creationId xmlns:a16="http://schemas.microsoft.com/office/drawing/2014/main" id="{240B191C-CB95-E010-13C4-D7FA0C3901E0}"/>
+          <p:cNvPr id="11" name="Group 10">
+            <a:extLst>
+              <a:ext uri="{FF2B5EF4-FFF2-40B4-BE49-F238E27FC236}">
+                <a16:creationId xmlns:a16="http://schemas.microsoft.com/office/drawing/2014/main" id="{F2A1040B-22B4-1ED1-74BE-750664EFD78A}"/>
               </a:ext>
             </a:extLst>
           </p:cNvPr>
@@ -5282,18 +5867,18 @@
         </p:nvGrpSpPr>
         <p:grpSpPr>
           <a:xfrm>
-            <a:off x="1643743" y="1066262"/>
-            <a:ext cx="7772400" cy="3081889"/>
-            <a:chOff x="1153886" y="1273090"/>
-            <a:chExt cx="7772400" cy="3081889"/>
+            <a:off x="1665515" y="1104783"/>
+            <a:ext cx="7772400" cy="3004846"/>
+            <a:chOff x="1665515" y="1104783"/>
+            <a:chExt cx="7772400" cy="3004846"/>
           </a:xfrm>
         </p:grpSpPr>
         <p:pic>
           <p:nvPicPr>
-            <p:cNvPr id="5" name="Picture 4">
+            <p:cNvPr id="10" name="Picture 9">
               <a:extLst>
                 <a:ext uri="{FF2B5EF4-FFF2-40B4-BE49-F238E27FC236}">
-                  <a16:creationId xmlns:a16="http://schemas.microsoft.com/office/drawing/2014/main" id="{F1486371-626F-14F4-1CB2-6A493B0F6E85}"/>
+                  <a16:creationId xmlns:a16="http://schemas.microsoft.com/office/drawing/2014/main" id="{98D8DADD-5A48-DF31-0C9C-5A8482439DDF}"/>
                 </a:ext>
               </a:extLst>
             </p:cNvPr>
@@ -5310,397 +5895,201 @@
           </p:blipFill>
           <p:spPr>
             <a:xfrm>
-              <a:off x="1153886" y="1273090"/>
-              <a:ext cx="7772400" cy="3081889"/>
+              <a:off x="1665515" y="1104783"/>
+              <a:ext cx="7772400" cy="3004846"/>
             </a:xfrm>
             <a:prstGeom prst="rect">
               <a:avLst/>
             </a:prstGeom>
+            <a:ln>
+              <a:solidFill>
+                <a:schemeClr val="tx1"/>
+              </a:solidFill>
+            </a:ln>
           </p:spPr>
         </p:pic>
-        <p:sp>
-          <p:nvSpPr>
-            <p:cNvPr id="6" name="Rounded Rectangle 5">
+        <p:grpSp>
+          <p:nvGrpSpPr>
+            <p:cNvPr id="9" name="Group 8">
               <a:extLst>
                 <a:ext uri="{FF2B5EF4-FFF2-40B4-BE49-F238E27FC236}">
-                  <a16:creationId xmlns:a16="http://schemas.microsoft.com/office/drawing/2014/main" id="{7720B37B-9221-06F6-5D61-6D976D912932}"/>
+                  <a16:creationId xmlns:a16="http://schemas.microsoft.com/office/drawing/2014/main" id="{240B191C-CB95-E010-13C4-D7FA0C3901E0}"/>
                 </a:ext>
               </a:extLst>
             </p:cNvPr>
-            <p:cNvSpPr/>
+            <p:cNvGrpSpPr/>
             <p:nvPr/>
-          </p:nvSpPr>
-          <p:spPr>
+          </p:nvGrpSpPr>
+          <p:grpSpPr>
             <a:xfrm>
-              <a:off x="5856515" y="4172856"/>
-              <a:ext cx="609599" cy="182123"/>
+              <a:off x="1872343" y="1649073"/>
+              <a:ext cx="5083629" cy="2460556"/>
+              <a:chOff x="1382486" y="1855901"/>
+              <a:chExt cx="5083629" cy="2460556"/>
             </a:xfrm>
-            <a:prstGeom prst="roundRect">
-              <a:avLst/>
-            </a:prstGeom>
-            <a:noFill/>
-            <a:ln w="38100">
-              <a:solidFill>
-                <a:srgbClr val="00B050"/>
-              </a:solidFill>
-            </a:ln>
-          </p:spPr>
-          <p:style>
-            <a:lnRef idx="2">
-              <a:schemeClr val="accent1">
-                <a:shade val="15000"/>
-              </a:schemeClr>
-            </a:lnRef>
-            <a:fillRef idx="1">
-              <a:schemeClr val="accent1"/>
-            </a:fillRef>
-            <a:effectRef idx="0">
-              <a:schemeClr val="accent1"/>
-            </a:effectRef>
-            <a:fontRef idx="minor">
-              <a:schemeClr val="lt1"/>
-            </a:fontRef>
-          </p:style>
-          <p:txBody>
-            <a:bodyPr rtlCol="0" anchor="ctr"/>
-            <a:lstStyle/>
-            <a:p>
-              <a:pPr algn="ctr"/>
-              <a:endParaRPr lang="en-US"/>
-            </a:p>
-          </p:txBody>
-        </p:sp>
-        <p:sp>
-          <p:nvSpPr>
-            <p:cNvPr id="7" name="Rounded Rectangle 6">
-              <a:extLst>
-                <a:ext uri="{FF2B5EF4-FFF2-40B4-BE49-F238E27FC236}">
-                  <a16:creationId xmlns:a16="http://schemas.microsoft.com/office/drawing/2014/main" id="{97F8984D-AD3C-E8CB-0C04-7DD009ABBABD}"/>
-                </a:ext>
-              </a:extLst>
-            </p:cNvPr>
-            <p:cNvSpPr/>
-            <p:nvPr/>
-          </p:nvSpPr>
-          <p:spPr>
-            <a:xfrm>
-              <a:off x="3886202" y="2814034"/>
-              <a:ext cx="195941" cy="614966"/>
-            </a:xfrm>
-            <a:prstGeom prst="roundRect">
-              <a:avLst/>
-            </a:prstGeom>
-            <a:noFill/>
-            <a:ln w="38100">
-              <a:solidFill>
-                <a:srgbClr val="00B050"/>
-              </a:solidFill>
-            </a:ln>
-          </p:spPr>
-          <p:style>
-            <a:lnRef idx="2">
-              <a:schemeClr val="accent1">
-                <a:shade val="15000"/>
-              </a:schemeClr>
-            </a:lnRef>
-            <a:fillRef idx="1">
-              <a:schemeClr val="accent1"/>
-            </a:fillRef>
-            <a:effectRef idx="0">
-              <a:schemeClr val="accent1"/>
-            </a:effectRef>
-            <a:fontRef idx="minor">
-              <a:schemeClr val="lt1"/>
-            </a:fontRef>
-          </p:style>
-          <p:txBody>
-            <a:bodyPr rtlCol="0" anchor="ctr"/>
-            <a:lstStyle/>
-            <a:p>
-              <a:pPr algn="ctr"/>
-              <a:endParaRPr lang="en-US"/>
-            </a:p>
-          </p:txBody>
-        </p:sp>
-        <p:sp>
-          <p:nvSpPr>
-            <p:cNvPr id="8" name="Rounded Rectangle 7">
-              <a:extLst>
-                <a:ext uri="{FF2B5EF4-FFF2-40B4-BE49-F238E27FC236}">
-                  <a16:creationId xmlns:a16="http://schemas.microsoft.com/office/drawing/2014/main" id="{9D0729B2-3F48-9604-274E-5ECFBFD8AA26}"/>
-                </a:ext>
-              </a:extLst>
-            </p:cNvPr>
-            <p:cNvSpPr/>
-            <p:nvPr/>
-          </p:nvSpPr>
-          <p:spPr>
-            <a:xfrm>
-              <a:off x="1393372" y="1834130"/>
-              <a:ext cx="805542" cy="832869"/>
-            </a:xfrm>
-            <a:prstGeom prst="roundRect">
-              <a:avLst/>
-            </a:prstGeom>
-            <a:noFill/>
-            <a:ln w="38100">
-              <a:solidFill>
-                <a:srgbClr val="00B050"/>
-              </a:solidFill>
-            </a:ln>
-          </p:spPr>
-          <p:style>
-            <a:lnRef idx="2">
-              <a:schemeClr val="accent1">
-                <a:shade val="15000"/>
-              </a:schemeClr>
-            </a:lnRef>
-            <a:fillRef idx="1">
-              <a:schemeClr val="accent1"/>
-            </a:fillRef>
-            <a:effectRef idx="0">
-              <a:schemeClr val="accent1"/>
-            </a:effectRef>
-            <a:fontRef idx="minor">
-              <a:schemeClr val="lt1"/>
-            </a:fontRef>
-          </p:style>
-          <p:txBody>
-            <a:bodyPr rtlCol="0" anchor="ctr"/>
-            <a:lstStyle/>
-            <a:p>
-              <a:pPr algn="ctr"/>
-              <a:endParaRPr lang="en-US"/>
-            </a:p>
-          </p:txBody>
-        </p:sp>
+          </p:grpSpPr>
+          <p:sp>
+            <p:nvSpPr>
+              <p:cNvPr id="6" name="Rounded Rectangle 5">
+                <a:extLst>
+                  <a:ext uri="{FF2B5EF4-FFF2-40B4-BE49-F238E27FC236}">
+                    <a16:creationId xmlns:a16="http://schemas.microsoft.com/office/drawing/2014/main" id="{7720B37B-9221-06F6-5D61-6D976D912932}"/>
+                  </a:ext>
+                </a:extLst>
+              </p:cNvPr>
+              <p:cNvSpPr/>
+              <p:nvPr/>
+            </p:nvSpPr>
+            <p:spPr>
+              <a:xfrm>
+                <a:off x="5812973" y="4180114"/>
+                <a:ext cx="653142" cy="136343"/>
+              </a:xfrm>
+              <a:prstGeom prst="roundRect">
+                <a:avLst/>
+              </a:prstGeom>
+              <a:noFill/>
+              <a:ln w="38100">
+                <a:solidFill>
+                  <a:srgbClr val="00B050"/>
+                </a:solidFill>
+              </a:ln>
+            </p:spPr>
+            <p:style>
+              <a:lnRef idx="2">
+                <a:schemeClr val="accent1">
+                  <a:shade val="15000"/>
+                </a:schemeClr>
+              </a:lnRef>
+              <a:fillRef idx="1">
+                <a:schemeClr val="accent1"/>
+              </a:fillRef>
+              <a:effectRef idx="0">
+                <a:schemeClr val="accent1"/>
+              </a:effectRef>
+              <a:fontRef idx="minor">
+                <a:schemeClr val="lt1"/>
+              </a:fontRef>
+            </p:style>
+            <p:txBody>
+              <a:bodyPr rtlCol="0" anchor="ctr"/>
+              <a:lstStyle/>
+              <a:p>
+                <a:pPr algn="ctr"/>
+                <a:endParaRPr lang="en-US"/>
+              </a:p>
+            </p:txBody>
+          </p:sp>
+          <p:sp>
+            <p:nvSpPr>
+              <p:cNvPr id="7" name="Rounded Rectangle 6">
+                <a:extLst>
+                  <a:ext uri="{FF2B5EF4-FFF2-40B4-BE49-F238E27FC236}">
+                    <a16:creationId xmlns:a16="http://schemas.microsoft.com/office/drawing/2014/main" id="{97F8984D-AD3C-E8CB-0C04-7DD009ABBABD}"/>
+                  </a:ext>
+                </a:extLst>
+              </p:cNvPr>
+              <p:cNvSpPr/>
+              <p:nvPr/>
+            </p:nvSpPr>
+            <p:spPr>
+              <a:xfrm>
+                <a:off x="3886202" y="2814034"/>
+                <a:ext cx="195941" cy="614966"/>
+              </a:xfrm>
+              <a:prstGeom prst="roundRect">
+                <a:avLst/>
+              </a:prstGeom>
+              <a:noFill/>
+              <a:ln w="38100">
+                <a:solidFill>
+                  <a:srgbClr val="00B050"/>
+                </a:solidFill>
+              </a:ln>
+            </p:spPr>
+            <p:style>
+              <a:lnRef idx="2">
+                <a:schemeClr val="accent1">
+                  <a:shade val="15000"/>
+                </a:schemeClr>
+              </a:lnRef>
+              <a:fillRef idx="1">
+                <a:schemeClr val="accent1"/>
+              </a:fillRef>
+              <a:effectRef idx="0">
+                <a:schemeClr val="accent1"/>
+              </a:effectRef>
+              <a:fontRef idx="minor">
+                <a:schemeClr val="lt1"/>
+              </a:fontRef>
+            </p:style>
+            <p:txBody>
+              <a:bodyPr rtlCol="0" anchor="ctr"/>
+              <a:lstStyle/>
+              <a:p>
+                <a:pPr algn="ctr"/>
+                <a:endParaRPr lang="en-US"/>
+              </a:p>
+            </p:txBody>
+          </p:sp>
+          <p:sp>
+            <p:nvSpPr>
+              <p:cNvPr id="8" name="Rounded Rectangle 7">
+                <a:extLst>
+                  <a:ext uri="{FF2B5EF4-FFF2-40B4-BE49-F238E27FC236}">
+                    <a16:creationId xmlns:a16="http://schemas.microsoft.com/office/drawing/2014/main" id="{9D0729B2-3F48-9604-274E-5ECFBFD8AA26}"/>
+                  </a:ext>
+                </a:extLst>
+              </p:cNvPr>
+              <p:cNvSpPr/>
+              <p:nvPr/>
+            </p:nvSpPr>
+            <p:spPr>
+              <a:xfrm>
+                <a:off x="1382486" y="1855901"/>
+                <a:ext cx="881742" cy="832869"/>
+              </a:xfrm>
+              <a:prstGeom prst="roundRect">
+                <a:avLst/>
+              </a:prstGeom>
+              <a:noFill/>
+              <a:ln w="38100">
+                <a:solidFill>
+                  <a:srgbClr val="00B050"/>
+                </a:solidFill>
+              </a:ln>
+            </p:spPr>
+            <p:style>
+              <a:lnRef idx="2">
+                <a:schemeClr val="accent1">
+                  <a:shade val="15000"/>
+                </a:schemeClr>
+              </a:lnRef>
+              <a:fillRef idx="1">
+                <a:schemeClr val="accent1"/>
+              </a:fillRef>
+              <a:effectRef idx="0">
+                <a:schemeClr val="accent1"/>
+              </a:effectRef>
+              <a:fontRef idx="minor">
+                <a:schemeClr val="lt1"/>
+              </a:fontRef>
+            </p:style>
+            <p:txBody>
+              <a:bodyPr rtlCol="0" anchor="ctr"/>
+              <a:lstStyle/>
+              <a:p>
+                <a:pPr algn="ctr"/>
+                <a:endParaRPr lang="en-US"/>
+              </a:p>
+            </p:txBody>
+          </p:sp>
+        </p:grpSp>
       </p:grpSp>
     </p:spTree>
     <p:extLst>
       <p:ext uri="{BB962C8B-B14F-4D97-AF65-F5344CB8AC3E}">
         <p14:creationId xmlns:p14="http://schemas.microsoft.com/office/powerpoint/2010/main" val="2449803105"/>
-      </p:ext>
-    </p:extLst>
-  </p:cSld>
-  <p:clrMapOvr>
-    <a:masterClrMapping/>
-  </p:clrMapOvr>
-</p:sld>
-</file>
-
-<file path=ppt/slides/slide7.xml><?xml version="1.0" encoding="utf-8"?>
-<p:sld xmlns:a="http://schemas.openxmlformats.org/drawingml/2006/main" xmlns:r="http://schemas.openxmlformats.org/officeDocument/2006/relationships" xmlns:p="http://schemas.openxmlformats.org/presentationml/2006/main">
-  <p:cSld>
-    <p:spTree>
-      <p:nvGrpSpPr>
-        <p:cNvPr id="1" name=""/>
-        <p:cNvGrpSpPr/>
-        <p:nvPr/>
-      </p:nvGrpSpPr>
-      <p:grpSpPr>
-        <a:xfrm>
-          <a:off x="0" y="0"/>
-          <a:ext cx="0" cy="0"/>
-          <a:chOff x="0" y="0"/>
-          <a:chExt cx="0" cy="0"/>
-        </a:xfrm>
-      </p:grpSpPr>
-      <p:grpSp>
-        <p:nvGrpSpPr>
-          <p:cNvPr id="6" name="Group 5">
-            <a:extLst>
-              <a:ext uri="{FF2B5EF4-FFF2-40B4-BE49-F238E27FC236}">
-                <a16:creationId xmlns:a16="http://schemas.microsoft.com/office/drawing/2014/main" id="{326D660D-8806-2058-05A1-FE0D08DBFA9E}"/>
-              </a:ext>
-            </a:extLst>
-          </p:cNvPr>
-          <p:cNvGrpSpPr/>
-          <p:nvPr/>
-        </p:nvGrpSpPr>
-        <p:grpSpPr>
-          <a:xfrm>
-            <a:off x="892629" y="638383"/>
-            <a:ext cx="7014687" cy="3683551"/>
-            <a:chOff x="2133601" y="485983"/>
-            <a:chExt cx="7014687" cy="3683551"/>
-          </a:xfrm>
-        </p:grpSpPr>
-        <p:pic>
-          <p:nvPicPr>
-            <p:cNvPr id="3074" name="Picture 2" descr="Structure of a basic app with sidebar">
-              <a:extLst>
-                <a:ext uri="{FF2B5EF4-FFF2-40B4-BE49-F238E27FC236}">
-                  <a16:creationId xmlns:a16="http://schemas.microsoft.com/office/drawing/2014/main" id="{4BC5A374-A490-D6F2-8B9F-AEA4B21410FF}"/>
-                </a:ext>
-              </a:extLst>
-            </p:cNvPr>
-            <p:cNvPicPr>
-              <a:picLocks noChangeAspect="1" noChangeArrowheads="1"/>
-            </p:cNvPicPr>
-            <p:nvPr/>
-          </p:nvPicPr>
-          <p:blipFill>
-            <a:blip r:embed="rId2">
-              <a:extLst>
-                <a:ext uri="{28A0092B-C50C-407E-A947-70E740481C1C}">
-                  <a14:useLocalDpi xmlns:a14="http://schemas.microsoft.com/office/drawing/2010/main" val="0"/>
-                </a:ext>
-              </a:extLst>
-            </a:blip>
-            <a:srcRect/>
-            <a:stretch>
-              <a:fillRect/>
-            </a:stretch>
-          </p:blipFill>
-          <p:spPr bwMode="auto">
-            <a:xfrm>
-              <a:off x="2133601" y="485983"/>
-              <a:ext cx="3014969" cy="1661766"/>
-            </a:xfrm>
-            <a:prstGeom prst="rect">
-              <a:avLst/>
-            </a:prstGeom>
-            <a:noFill/>
-            <a:extLst>
-              <a:ext uri="{909E8E84-426E-40DD-AFC4-6F175D3DCCD1}">
-                <a14:hiddenFill xmlns:a14="http://schemas.microsoft.com/office/drawing/2010/main">
-                  <a:solidFill>
-                    <a:srgbClr val="FFFFFF"/>
-                  </a:solidFill>
-                </a14:hiddenFill>
-              </a:ext>
-            </a:extLst>
-          </p:spPr>
-        </p:pic>
-        <p:pic>
-          <p:nvPicPr>
-            <p:cNvPr id="3076" name="Picture 4" descr="The structure underlying a simple multi-row app">
-              <a:extLst>
-                <a:ext uri="{FF2B5EF4-FFF2-40B4-BE49-F238E27FC236}">
-                  <a16:creationId xmlns:a16="http://schemas.microsoft.com/office/drawing/2014/main" id="{27322FF0-7345-B818-1722-83E5091F339D}"/>
-                </a:ext>
-              </a:extLst>
-            </p:cNvPr>
-            <p:cNvPicPr>
-              <a:picLocks noChangeAspect="1" noChangeArrowheads="1"/>
-            </p:cNvPicPr>
-            <p:nvPr/>
-          </p:nvPicPr>
-          <p:blipFill>
-            <a:blip r:embed="rId3">
-              <a:extLst>
-                <a:ext uri="{28A0092B-C50C-407E-A947-70E740481C1C}">
-                  <a14:useLocalDpi xmlns:a14="http://schemas.microsoft.com/office/drawing/2010/main" val="0"/>
-                </a:ext>
-              </a:extLst>
-            </a:blip>
-            <a:srcRect/>
-            <a:stretch>
-              <a:fillRect/>
-            </a:stretch>
-          </p:blipFill>
-          <p:spPr bwMode="auto">
-            <a:xfrm>
-              <a:off x="2133601" y="2264229"/>
-              <a:ext cx="3014968" cy="1905305"/>
-            </a:xfrm>
-            <a:prstGeom prst="rect">
-              <a:avLst/>
-            </a:prstGeom>
-            <a:noFill/>
-            <a:extLst>
-              <a:ext uri="{909E8E84-426E-40DD-AFC4-6F175D3DCCD1}">
-                <a14:hiddenFill xmlns:a14="http://schemas.microsoft.com/office/drawing/2010/main">
-                  <a:solidFill>
-                    <a:srgbClr val="FFFFFF"/>
-                  </a:solidFill>
-                </a14:hiddenFill>
-              </a:ext>
-            </a:extLst>
-          </p:spPr>
-        </p:pic>
-        <p:pic>
-          <p:nvPicPr>
-            <p:cNvPr id="5" name="Picture 4">
-              <a:extLst>
-                <a:ext uri="{FF2B5EF4-FFF2-40B4-BE49-F238E27FC236}">
-                  <a16:creationId xmlns:a16="http://schemas.microsoft.com/office/drawing/2014/main" id="{6BFAA16B-2DBF-9209-1686-AB32D83C4EE3}"/>
-                </a:ext>
-              </a:extLst>
-            </p:cNvPr>
-            <p:cNvPicPr>
-              <a:picLocks noChangeAspect="1"/>
-            </p:cNvPicPr>
-            <p:nvPr/>
-          </p:nvPicPr>
-          <p:blipFill>
-            <a:blip r:embed="rId4"/>
-            <a:stretch>
-              <a:fillRect/>
-            </a:stretch>
-          </p:blipFill>
-          <p:spPr>
-            <a:xfrm>
-              <a:off x="5517244" y="1316866"/>
-              <a:ext cx="3631044" cy="2081892"/>
-            </a:xfrm>
-            <a:prstGeom prst="rect">
-              <a:avLst/>
-            </a:prstGeom>
-          </p:spPr>
-        </p:pic>
-      </p:grpSp>
-      <p:pic>
-        <p:nvPicPr>
-          <p:cNvPr id="3080" name="Picture 8">
-            <a:extLst>
-              <a:ext uri="{FF2B5EF4-FFF2-40B4-BE49-F238E27FC236}">
-                <a16:creationId xmlns:a16="http://schemas.microsoft.com/office/drawing/2014/main" id="{2F5B371F-17E7-E30C-7D82-5F475061CB5D}"/>
-              </a:ext>
-            </a:extLst>
-          </p:cNvPr>
-          <p:cNvPicPr>
-            <a:picLocks noChangeAspect="1" noChangeArrowheads="1"/>
-          </p:cNvPicPr>
-          <p:nvPr/>
-        </p:nvPicPr>
-        <p:blipFill>
-          <a:blip r:embed="rId5">
-            <a:extLst>
-              <a:ext uri="{28A0092B-C50C-407E-A947-70E740481C1C}">
-                <a14:useLocalDpi xmlns:a14="http://schemas.microsoft.com/office/drawing/2010/main" val="0"/>
-              </a:ext>
-            </a:extLst>
-          </a:blip>
-          <a:srcRect/>
-          <a:stretch>
-            <a:fillRect/>
-          </a:stretch>
-        </p:blipFill>
-        <p:spPr bwMode="auto">
-          <a:xfrm>
-            <a:off x="5061155" y="3920825"/>
-            <a:ext cx="5692321" cy="2450946"/>
-          </a:xfrm>
-          <a:prstGeom prst="rect">
-            <a:avLst/>
-          </a:prstGeom>
-          <a:noFill/>
-          <a:extLst>
-            <a:ext uri="{909E8E84-426E-40DD-AFC4-6F175D3DCCD1}">
-              <a14:hiddenFill xmlns:a14="http://schemas.microsoft.com/office/drawing/2010/main">
-                <a:solidFill>
-                  <a:srgbClr val="FFFFFF"/>
-                </a:solidFill>
-              </a14:hiddenFill>
-            </a:ext>
-          </a:extLst>
-        </p:spPr>
-      </p:pic>
-    </p:spTree>
-    <p:extLst>
-      <p:ext uri="{BB962C8B-B14F-4D97-AF65-F5344CB8AC3E}">
-        <p14:creationId xmlns:p14="http://schemas.microsoft.com/office/powerpoint/2010/main" val="3880621108"/>
       </p:ext>
     </p:extLst>
   </p:cSld>

</xml_diff>